<commit_message>
Add model use key
</commit_message>
<xml_diff>
--- a/use_cases.pptx
+++ b/use_cases.pptx
@@ -466,7 +466,7 @@
           <a:p>
             <a:fld id="{643F7372-8583-3647-8A6D-8602282481EA}" type="datetimeFigureOut">
               <a:rPr lang="en-US" smtClean="0"/>
-              <a:t>10/24/24</a:t>
+              <a:t>4/16/25</a:t>
             </a:fld>
             <a:endParaRPr lang="en-US"/>
           </a:p>
@@ -953,7 +953,7 @@
           <a:p>
             <a:fld id="{EA997AF5-C9B8-654C-B523-B4077F0C4FC6}" type="datetimeFigureOut">
               <a:rPr lang="en-GB" smtClean="0"/>
-              <a:t>24/10/2024</a:t>
+              <a:t>16/04/2025</a:t>
             </a:fld>
             <a:endParaRPr lang="en-GB"/>
           </a:p>
@@ -1123,7 +1123,7 @@
           <a:p>
             <a:fld id="{EA997AF5-C9B8-654C-B523-B4077F0C4FC6}" type="datetimeFigureOut">
               <a:rPr lang="en-GB" smtClean="0"/>
-              <a:t>24/10/2024</a:t>
+              <a:t>16/04/2025</a:t>
             </a:fld>
             <a:endParaRPr lang="en-GB"/>
           </a:p>
@@ -1303,7 +1303,7 @@
           <a:p>
             <a:fld id="{EA997AF5-C9B8-654C-B523-B4077F0C4FC6}" type="datetimeFigureOut">
               <a:rPr lang="en-GB" smtClean="0"/>
-              <a:t>24/10/2024</a:t>
+              <a:t>16/04/2025</a:t>
             </a:fld>
             <a:endParaRPr lang="en-GB"/>
           </a:p>
@@ -1473,7 +1473,7 @@
           <a:p>
             <a:fld id="{EA997AF5-C9B8-654C-B523-B4077F0C4FC6}" type="datetimeFigureOut">
               <a:rPr lang="en-GB" smtClean="0"/>
-              <a:t>24/10/2024</a:t>
+              <a:t>16/04/2025</a:t>
             </a:fld>
             <a:endParaRPr lang="en-GB"/>
           </a:p>
@@ -1719,7 +1719,7 @@
           <a:p>
             <a:fld id="{EA997AF5-C9B8-654C-B523-B4077F0C4FC6}" type="datetimeFigureOut">
               <a:rPr lang="en-GB" smtClean="0"/>
-              <a:t>24/10/2024</a:t>
+              <a:t>16/04/2025</a:t>
             </a:fld>
             <a:endParaRPr lang="en-GB"/>
           </a:p>
@@ -1951,7 +1951,7 @@
           <a:p>
             <a:fld id="{EA997AF5-C9B8-654C-B523-B4077F0C4FC6}" type="datetimeFigureOut">
               <a:rPr lang="en-GB" smtClean="0"/>
-              <a:t>24/10/2024</a:t>
+              <a:t>16/04/2025</a:t>
             </a:fld>
             <a:endParaRPr lang="en-GB"/>
           </a:p>
@@ -2318,7 +2318,7 @@
           <a:p>
             <a:fld id="{EA997AF5-C9B8-654C-B523-B4077F0C4FC6}" type="datetimeFigureOut">
               <a:rPr lang="en-GB" smtClean="0"/>
-              <a:t>24/10/2024</a:t>
+              <a:t>16/04/2025</a:t>
             </a:fld>
             <a:endParaRPr lang="en-GB"/>
           </a:p>
@@ -2436,7 +2436,7 @@
           <a:p>
             <a:fld id="{EA997AF5-C9B8-654C-B523-B4077F0C4FC6}" type="datetimeFigureOut">
               <a:rPr lang="en-GB" smtClean="0"/>
-              <a:t>24/10/2024</a:t>
+              <a:t>16/04/2025</a:t>
             </a:fld>
             <a:endParaRPr lang="en-GB"/>
           </a:p>
@@ -2531,7 +2531,7 @@
           <a:p>
             <a:fld id="{EA997AF5-C9B8-654C-B523-B4077F0C4FC6}" type="datetimeFigureOut">
               <a:rPr lang="en-GB" smtClean="0"/>
-              <a:t>24/10/2024</a:t>
+              <a:t>16/04/2025</a:t>
             </a:fld>
             <a:endParaRPr lang="en-GB"/>
           </a:p>
@@ -2808,7 +2808,7 @@
           <a:p>
             <a:fld id="{EA997AF5-C9B8-654C-B523-B4077F0C4FC6}" type="datetimeFigureOut">
               <a:rPr lang="en-GB" smtClean="0"/>
-              <a:t>24/10/2024</a:t>
+              <a:t>16/04/2025</a:t>
             </a:fld>
             <a:endParaRPr lang="en-GB"/>
           </a:p>
@@ -3065,7 +3065,7 @@
           <a:p>
             <a:fld id="{EA997AF5-C9B8-654C-B523-B4077F0C4FC6}" type="datetimeFigureOut">
               <a:rPr lang="en-GB" smtClean="0"/>
-              <a:t>24/10/2024</a:t>
+              <a:t>16/04/2025</a:t>
             </a:fld>
             <a:endParaRPr lang="en-GB"/>
           </a:p>
@@ -3278,7 +3278,7 @@
           <a:p>
             <a:fld id="{EA997AF5-C9B8-654C-B523-B4077F0C4FC6}" type="datetimeFigureOut">
               <a:rPr lang="en-GB" smtClean="0"/>
-              <a:t>24/10/2024</a:t>
+              <a:t>16/04/2025</a:t>
             </a:fld>
             <a:endParaRPr lang="en-GB"/>
           </a:p>
@@ -15535,21 +15535,10 @@
                 </a:solidFill>
                 <a:latin typeface="Century Gothic" panose="020B0502020202020204" pitchFamily="34" charset="0"/>
               </a:rPr>
-              <a:t>Version 5</a:t>
+              <a:t>Version 6, 16</a:t>
             </a:r>
             <a:r>
-              <a:rPr lang="en-GB" sz="2000">
-                <a:solidFill>
-                  <a:schemeClr val="bg1">
-                    <a:lumMod val="50000"/>
-                  </a:schemeClr>
-                </a:solidFill>
-                <a:latin typeface="Century Gothic" panose="020B0502020202020204" pitchFamily="34" charset="0"/>
-              </a:rPr>
-              <a:t>, 24</a:t>
-            </a:r>
-            <a:r>
-              <a:rPr lang="en-GB" sz="2000" baseline="30000">
+              <a:rPr lang="en-GB" sz="2000" baseline="30000" dirty="0">
                 <a:solidFill>
                   <a:schemeClr val="bg1">
                     <a:lumMod val="50000"/>
@@ -15560,7 +15549,7 @@
               <a:t>th</a:t>
             </a:r>
             <a:r>
-              <a:rPr lang="en-GB" sz="2000">
+              <a:rPr lang="en-GB" sz="2000" dirty="0">
                 <a:solidFill>
                   <a:schemeClr val="bg1">
                     <a:lumMod val="50000"/>
@@ -15568,18 +15557,7 @@
                 </a:solidFill>
                 <a:latin typeface="Century Gothic" panose="020B0502020202020204" pitchFamily="34" charset="0"/>
               </a:rPr>
-              <a:t> </a:t>
-            </a:r>
-            <a:r>
-              <a:rPr lang="en-GB" sz="2000" dirty="0">
-                <a:solidFill>
-                  <a:schemeClr val="bg1">
-                    <a:lumMod val="50000"/>
-                  </a:schemeClr>
-                </a:solidFill>
-                <a:latin typeface="Century Gothic" panose="020B0502020202020204" pitchFamily="34" charset="0"/>
-              </a:rPr>
-              <a:t>October 2024. Prepared by D </a:t>
+              <a:t> April 2025. Prepared by D </a:t>
             </a:r>
             <a:r>
               <a:rPr lang="en-GB" sz="2000" dirty="0" err="1">
@@ -18875,10 +18853,10 @@
       </p:grpSp>
       <p:grpSp>
         <p:nvGrpSpPr>
-          <p:cNvPr id="19" name="Group 18">
+          <p:cNvPr id="317" name="Group 316">
             <a:extLst>
               <a:ext uri="{FF2B5EF4-FFF2-40B4-BE49-F238E27FC236}">
-                <a16:creationId xmlns:a16="http://schemas.microsoft.com/office/drawing/2014/main" id="{F465CDB0-6493-2D84-A891-368F805AE19E}"/>
+                <a16:creationId xmlns:a16="http://schemas.microsoft.com/office/drawing/2014/main" id="{D7AFC344-F5D1-4EB6-5B65-2D0C7F854270}"/>
               </a:ext>
             </a:extLst>
           </p:cNvPr>
@@ -18889,7 +18867,7 @@
           <a:xfrm>
             <a:off x="13743968" y="15431783"/>
             <a:ext cx="4324406" cy="3325058"/>
-            <a:chOff x="15220704" y="16694762"/>
+            <a:chOff x="13743968" y="15431783"/>
             <a:chExt cx="4324406" cy="3325058"/>
           </a:xfrm>
         </p:grpSpPr>
@@ -18907,7 +18885,7 @@
           </p:nvGrpSpPr>
           <p:grpSpPr>
             <a:xfrm>
-              <a:off x="18330885" y="16811136"/>
+              <a:off x="16854149" y="15548157"/>
               <a:ext cx="1061748" cy="1238986"/>
               <a:chOff x="8136941" y="5623858"/>
               <a:chExt cx="1061748" cy="1238986"/>
@@ -19542,7 +19520,7 @@
           </p:nvSpPr>
           <p:spPr>
             <a:xfrm>
-              <a:off x="15220704" y="16694762"/>
+              <a:off x="13743968" y="15431783"/>
               <a:ext cx="4324406" cy="3325058"/>
             </a:xfrm>
             <a:prstGeom prst="roundRect">
@@ -26067,6 +26045,762 @@
           </a:prstGeom>
         </p:spPr>
       </p:pic>
+      <p:grpSp>
+        <p:nvGrpSpPr>
+          <p:cNvPr id="321" name="Group 320">
+            <a:extLst>
+              <a:ext uri="{FF2B5EF4-FFF2-40B4-BE49-F238E27FC236}">
+                <a16:creationId xmlns:a16="http://schemas.microsoft.com/office/drawing/2014/main" id="{CA999B6A-31A8-95DD-736C-8DA2F2010DB4}"/>
+              </a:ext>
+            </a:extLst>
+          </p:cNvPr>
+          <p:cNvGrpSpPr/>
+          <p:nvPr/>
+        </p:nvGrpSpPr>
+        <p:grpSpPr>
+          <a:xfrm>
+            <a:off x="398655" y="19283479"/>
+            <a:ext cx="2910258" cy="2806700"/>
+            <a:chOff x="215716" y="19377761"/>
+            <a:chExt cx="2910258" cy="2806700"/>
+          </a:xfrm>
+        </p:grpSpPr>
+        <p:sp>
+          <p:nvSpPr>
+            <p:cNvPr id="319" name="Rounded Rectangle 318">
+              <a:extLst>
+                <a:ext uri="{FF2B5EF4-FFF2-40B4-BE49-F238E27FC236}">
+                  <a16:creationId xmlns:a16="http://schemas.microsoft.com/office/drawing/2014/main" id="{53BF7B41-D345-3A90-1101-385736481AD2}"/>
+                </a:ext>
+              </a:extLst>
+            </p:cNvPr>
+            <p:cNvSpPr/>
+            <p:nvPr/>
+          </p:nvSpPr>
+          <p:spPr>
+            <a:xfrm>
+              <a:off x="215716" y="19377761"/>
+              <a:ext cx="2910258" cy="2806700"/>
+            </a:xfrm>
+            <a:prstGeom prst="roundRect">
+              <a:avLst>
+                <a:gd name="adj" fmla="val 4617"/>
+              </a:avLst>
+            </a:prstGeom>
+            <a:solidFill>
+              <a:schemeClr val="bg1">
+                <a:lumMod val="95000"/>
+              </a:schemeClr>
+            </a:solidFill>
+            <a:ln>
+              <a:noFill/>
+            </a:ln>
+          </p:spPr>
+          <p:style>
+            <a:lnRef idx="2">
+              <a:schemeClr val="accent1">
+                <a:shade val="15000"/>
+              </a:schemeClr>
+            </a:lnRef>
+            <a:fillRef idx="1">
+              <a:schemeClr val="accent1"/>
+            </a:fillRef>
+            <a:effectRef idx="0">
+              <a:schemeClr val="accent1"/>
+            </a:effectRef>
+            <a:fontRef idx="minor">
+              <a:schemeClr val="lt1"/>
+            </a:fontRef>
+          </p:style>
+          <p:txBody>
+            <a:bodyPr rtlCol="0" anchor="ctr"/>
+            <a:lstStyle/>
+            <a:p>
+              <a:pPr algn="ctr"/>
+              <a:endParaRPr lang="en-GB"/>
+            </a:p>
+          </p:txBody>
+        </p:sp>
+        <p:grpSp>
+          <p:nvGrpSpPr>
+            <p:cNvPr id="193" name="Group 192">
+              <a:extLst>
+                <a:ext uri="{FF2B5EF4-FFF2-40B4-BE49-F238E27FC236}">
+                  <a16:creationId xmlns:a16="http://schemas.microsoft.com/office/drawing/2014/main" id="{3AEF3BD1-F36D-1F45-C374-FB0BC85B01CB}"/>
+                </a:ext>
+              </a:extLst>
+            </p:cNvPr>
+            <p:cNvGrpSpPr/>
+            <p:nvPr/>
+          </p:nvGrpSpPr>
+          <p:grpSpPr>
+            <a:xfrm>
+              <a:off x="1139971" y="20675722"/>
+              <a:ext cx="1061748" cy="1238986"/>
+              <a:chOff x="8136941" y="5623858"/>
+              <a:chExt cx="1061748" cy="1238986"/>
+            </a:xfrm>
+          </p:grpSpPr>
+          <p:sp>
+            <p:nvSpPr>
+              <p:cNvPr id="194" name="Rounded Rectangle 193">
+                <a:extLst>
+                  <a:ext uri="{FF2B5EF4-FFF2-40B4-BE49-F238E27FC236}">
+                    <a16:creationId xmlns:a16="http://schemas.microsoft.com/office/drawing/2014/main" id="{9A57A3E3-DD6A-1950-55A2-5083B1D68AC5}"/>
+                  </a:ext>
+                </a:extLst>
+              </p:cNvPr>
+              <p:cNvSpPr/>
+              <p:nvPr/>
+            </p:nvSpPr>
+            <p:spPr>
+              <a:xfrm>
+                <a:off x="8728980" y="5917072"/>
+                <a:ext cx="467920" cy="267960"/>
+              </a:xfrm>
+              <a:prstGeom prst="roundRect">
+                <a:avLst>
+                  <a:gd name="adj" fmla="val 5628"/>
+                </a:avLst>
+              </a:prstGeom>
+              <a:noFill/>
+              <a:ln w="3175">
+                <a:solidFill>
+                  <a:srgbClr val="C00000"/>
+                </a:solidFill>
+              </a:ln>
+            </p:spPr>
+            <p:style>
+              <a:lnRef idx="2">
+                <a:schemeClr val="accent1">
+                  <a:shade val="15000"/>
+                </a:schemeClr>
+              </a:lnRef>
+              <a:fillRef idx="1">
+                <a:schemeClr val="accent1"/>
+              </a:fillRef>
+              <a:effectRef idx="0">
+                <a:schemeClr val="accent1"/>
+              </a:effectRef>
+              <a:fontRef idx="minor">
+                <a:schemeClr val="lt1"/>
+              </a:fontRef>
+            </p:style>
+            <p:txBody>
+              <a:bodyPr lIns="36000" tIns="36000" rIns="36000" bIns="36000" rtlCol="0" anchor="ctr"/>
+              <a:lstStyle/>
+              <a:p>
+                <a:pPr marL="0" marR="0" lvl="0" indent="0" algn="ctr" defTabSz="914400" rtl="0" eaLnBrk="1" fontAlgn="auto" latinLnBrk="0" hangingPunct="1">
+                  <a:lnSpc>
+                    <a:spcPct val="100000"/>
+                  </a:lnSpc>
+                  <a:spcBef>
+                    <a:spcPts val="0"/>
+                  </a:spcBef>
+                  <a:spcAft>
+                    <a:spcPts val="0"/>
+                  </a:spcAft>
+                  <a:buClrTx/>
+                  <a:buSzTx/>
+                  <a:buFontTx/>
+                  <a:buNone/>
+                  <a:tabLst/>
+                  <a:defRPr/>
+                </a:pPr>
+                <a:endParaRPr kumimoji="0" lang="en-GB" sz="2400" b="1" i="0" u="none" strike="noStrike" kern="1200" cap="none" spc="0" normalizeH="0" baseline="0" noProof="0" dirty="0">
+                  <a:ln>
+                    <a:noFill/>
+                  </a:ln>
+                  <a:solidFill>
+                    <a:srgbClr val="C00000"/>
+                  </a:solidFill>
+                  <a:effectLst/>
+                  <a:uLnTx/>
+                  <a:uFillTx/>
+                  <a:latin typeface="Arial" panose="020B0604020202020204"/>
+                  <a:ea typeface="+mn-ea"/>
+                  <a:cs typeface="+mn-cs"/>
+                </a:endParaRPr>
+              </a:p>
+            </p:txBody>
+          </p:sp>
+          <p:sp>
+            <p:nvSpPr>
+              <p:cNvPr id="229" name="Rounded Rectangle 228">
+                <a:extLst>
+                  <a:ext uri="{FF2B5EF4-FFF2-40B4-BE49-F238E27FC236}">
+                    <a16:creationId xmlns:a16="http://schemas.microsoft.com/office/drawing/2014/main" id="{B19F4C9E-F14A-7DFB-2033-5847F38675BE}"/>
+                  </a:ext>
+                </a:extLst>
+              </p:cNvPr>
+              <p:cNvSpPr/>
+              <p:nvPr/>
+            </p:nvSpPr>
+            <p:spPr>
+              <a:xfrm>
+                <a:off x="8728980" y="6228640"/>
+                <a:ext cx="469704" cy="311421"/>
+              </a:xfrm>
+              <a:prstGeom prst="roundRect">
+                <a:avLst>
+                  <a:gd name="adj" fmla="val 5628"/>
+                </a:avLst>
+              </a:prstGeom>
+              <a:noFill/>
+              <a:ln w="3175">
+                <a:solidFill>
+                  <a:schemeClr val="accent2">
+                    <a:lumMod val="50000"/>
+                  </a:schemeClr>
+                </a:solidFill>
+              </a:ln>
+            </p:spPr>
+            <p:style>
+              <a:lnRef idx="2">
+                <a:schemeClr val="accent1">
+                  <a:shade val="15000"/>
+                </a:schemeClr>
+              </a:lnRef>
+              <a:fillRef idx="1">
+                <a:schemeClr val="accent1"/>
+              </a:fillRef>
+              <a:effectRef idx="0">
+                <a:schemeClr val="accent1"/>
+              </a:effectRef>
+              <a:fontRef idx="minor">
+                <a:schemeClr val="lt1"/>
+              </a:fontRef>
+            </p:style>
+            <p:txBody>
+              <a:bodyPr lIns="36000" tIns="36000" rIns="36000" bIns="36000" rtlCol="0" anchor="ctr"/>
+              <a:lstStyle/>
+              <a:p>
+                <a:pPr marL="0" marR="0" lvl="0" indent="0" algn="ctr" defTabSz="914400" rtl="0" eaLnBrk="1" fontAlgn="auto" latinLnBrk="0" hangingPunct="1">
+                  <a:lnSpc>
+                    <a:spcPct val="100000"/>
+                  </a:lnSpc>
+                  <a:spcBef>
+                    <a:spcPts val="0"/>
+                  </a:spcBef>
+                  <a:spcAft>
+                    <a:spcPts val="0"/>
+                  </a:spcAft>
+                  <a:buClrTx/>
+                  <a:buSzTx/>
+                  <a:buFontTx/>
+                  <a:buNone/>
+                  <a:tabLst/>
+                  <a:defRPr/>
+                </a:pPr>
+                <a:endParaRPr kumimoji="0" lang="en-GB" sz="2400" b="1" i="0" u="none" strike="noStrike" kern="1200" cap="none" spc="0" normalizeH="0" baseline="0" noProof="0" dirty="0">
+                  <a:ln>
+                    <a:noFill/>
+                  </a:ln>
+                  <a:solidFill>
+                    <a:schemeClr val="accent2">
+                      <a:lumMod val="75000"/>
+                    </a:schemeClr>
+                  </a:solidFill>
+                  <a:effectLst/>
+                  <a:uLnTx/>
+                  <a:uFillTx/>
+                  <a:latin typeface="Century Gothic" panose="020B0502020202020204" pitchFamily="34" charset="0"/>
+                </a:endParaRPr>
+              </a:p>
+            </p:txBody>
+          </p:sp>
+          <p:sp>
+            <p:nvSpPr>
+              <p:cNvPr id="230" name="Rounded Rectangle 229">
+                <a:extLst>
+                  <a:ext uri="{FF2B5EF4-FFF2-40B4-BE49-F238E27FC236}">
+                    <a16:creationId xmlns:a16="http://schemas.microsoft.com/office/drawing/2014/main" id="{90A3457A-D2B4-36FE-286E-E840AF9E4B88}"/>
+                  </a:ext>
+                </a:extLst>
+              </p:cNvPr>
+              <p:cNvSpPr/>
+              <p:nvPr/>
+            </p:nvSpPr>
+            <p:spPr>
+              <a:xfrm>
+                <a:off x="8567591" y="6588749"/>
+                <a:ext cx="631098" cy="274095"/>
+              </a:xfrm>
+              <a:prstGeom prst="roundRect">
+                <a:avLst>
+                  <a:gd name="adj" fmla="val 5628"/>
+                </a:avLst>
+              </a:prstGeom>
+              <a:solidFill>
+                <a:srgbClr val="FFC000">
+                  <a:alpha val="47843"/>
+                </a:srgbClr>
+              </a:solidFill>
+              <a:ln w="3175">
+                <a:solidFill>
+                  <a:schemeClr val="accent2">
+                    <a:lumMod val="50000"/>
+                  </a:schemeClr>
+                </a:solidFill>
+              </a:ln>
+            </p:spPr>
+            <p:style>
+              <a:lnRef idx="2">
+                <a:schemeClr val="accent1">
+                  <a:shade val="15000"/>
+                </a:schemeClr>
+              </a:lnRef>
+              <a:fillRef idx="1">
+                <a:schemeClr val="accent1"/>
+              </a:fillRef>
+              <a:effectRef idx="0">
+                <a:schemeClr val="accent1"/>
+              </a:effectRef>
+              <a:fontRef idx="minor">
+                <a:schemeClr val="lt1"/>
+              </a:fontRef>
+            </p:style>
+            <p:txBody>
+              <a:bodyPr lIns="36000" tIns="36000" rIns="36000" bIns="36000" rtlCol="0" anchor="ctr"/>
+              <a:lstStyle/>
+              <a:p>
+                <a:pPr marL="0" marR="0" lvl="0" indent="0" algn="ctr" defTabSz="914400" rtl="0" eaLnBrk="1" fontAlgn="auto" latinLnBrk="0" hangingPunct="1">
+                  <a:lnSpc>
+                    <a:spcPct val="100000"/>
+                  </a:lnSpc>
+                  <a:spcBef>
+                    <a:spcPts val="0"/>
+                  </a:spcBef>
+                  <a:spcAft>
+                    <a:spcPts val="0"/>
+                  </a:spcAft>
+                  <a:buClrTx/>
+                  <a:buSzTx/>
+                  <a:buFontTx/>
+                  <a:buNone/>
+                  <a:tabLst/>
+                  <a:defRPr/>
+                </a:pPr>
+                <a:endParaRPr kumimoji="0" lang="en-GB" sz="2400" b="1" i="0" u="none" strike="noStrike" kern="1200" cap="none" spc="0" normalizeH="0" baseline="0" noProof="0" dirty="0">
+                  <a:ln>
+                    <a:noFill/>
+                  </a:ln>
+                  <a:solidFill>
+                    <a:schemeClr val="accent2">
+                      <a:lumMod val="50000"/>
+                    </a:schemeClr>
+                  </a:solidFill>
+                  <a:effectLst/>
+                  <a:uLnTx/>
+                  <a:uFillTx/>
+                  <a:latin typeface="Century Gothic" panose="020B0502020202020204" pitchFamily="34" charset="0"/>
+                </a:endParaRPr>
+              </a:p>
+            </p:txBody>
+          </p:sp>
+          <p:sp>
+            <p:nvSpPr>
+              <p:cNvPr id="232" name="Rounded Rectangle 231">
+                <a:extLst>
+                  <a:ext uri="{FF2B5EF4-FFF2-40B4-BE49-F238E27FC236}">
+                    <a16:creationId xmlns:a16="http://schemas.microsoft.com/office/drawing/2014/main" id="{98C70286-1B80-1CB4-47EA-C71E72FA53D3}"/>
+                  </a:ext>
+                </a:extLst>
+              </p:cNvPr>
+              <p:cNvSpPr/>
+              <p:nvPr/>
+            </p:nvSpPr>
+            <p:spPr>
+              <a:xfrm>
+                <a:off x="8136941" y="6588749"/>
+                <a:ext cx="366397" cy="274095"/>
+              </a:xfrm>
+              <a:prstGeom prst="roundRect">
+                <a:avLst>
+                  <a:gd name="adj" fmla="val 5628"/>
+                </a:avLst>
+              </a:prstGeom>
+              <a:solidFill>
+                <a:schemeClr val="accent3">
+                  <a:lumMod val="60000"/>
+                  <a:lumOff val="40000"/>
+                  <a:alpha val="47843"/>
+                </a:schemeClr>
+              </a:solidFill>
+              <a:ln w="3175">
+                <a:solidFill>
+                  <a:schemeClr val="accent3">
+                    <a:lumMod val="75000"/>
+                  </a:schemeClr>
+                </a:solidFill>
+              </a:ln>
+            </p:spPr>
+            <p:style>
+              <a:lnRef idx="2">
+                <a:schemeClr val="accent1">
+                  <a:shade val="15000"/>
+                </a:schemeClr>
+              </a:lnRef>
+              <a:fillRef idx="1">
+                <a:schemeClr val="accent1"/>
+              </a:fillRef>
+              <a:effectRef idx="0">
+                <a:schemeClr val="accent1"/>
+              </a:effectRef>
+              <a:fontRef idx="minor">
+                <a:schemeClr val="lt1"/>
+              </a:fontRef>
+            </p:style>
+            <p:txBody>
+              <a:bodyPr lIns="36000" tIns="36000" rIns="36000" bIns="36000" rtlCol="0" anchor="ctr"/>
+              <a:lstStyle/>
+              <a:p>
+                <a:pPr marL="0" marR="0" lvl="0" indent="0" algn="ctr" defTabSz="914400" rtl="0" eaLnBrk="1" fontAlgn="auto" latinLnBrk="0" hangingPunct="1">
+                  <a:lnSpc>
+                    <a:spcPct val="100000"/>
+                  </a:lnSpc>
+                  <a:spcBef>
+                    <a:spcPts val="0"/>
+                  </a:spcBef>
+                  <a:spcAft>
+                    <a:spcPts val="0"/>
+                  </a:spcAft>
+                  <a:buClrTx/>
+                  <a:buSzTx/>
+                  <a:buFontTx/>
+                  <a:buNone/>
+                  <a:tabLst/>
+                  <a:defRPr/>
+                </a:pPr>
+                <a:endParaRPr kumimoji="0" lang="en-GB" sz="2400" b="1" i="0" u="none" strike="noStrike" kern="1200" cap="none" spc="0" normalizeH="0" baseline="0" noProof="0" dirty="0">
+                  <a:ln>
+                    <a:noFill/>
+                  </a:ln>
+                  <a:solidFill>
+                    <a:schemeClr val="accent6">
+                      <a:lumMod val="75000"/>
+                    </a:schemeClr>
+                  </a:solidFill>
+                  <a:effectLst/>
+                  <a:uLnTx/>
+                  <a:uFillTx/>
+                  <a:latin typeface="Century Gothic" panose="020B0502020202020204" pitchFamily="34" charset="0"/>
+                </a:endParaRPr>
+              </a:p>
+            </p:txBody>
+          </p:sp>
+          <p:sp>
+            <p:nvSpPr>
+              <p:cNvPr id="234" name="Rounded Rectangle 233">
+                <a:extLst>
+                  <a:ext uri="{FF2B5EF4-FFF2-40B4-BE49-F238E27FC236}">
+                    <a16:creationId xmlns:a16="http://schemas.microsoft.com/office/drawing/2014/main" id="{370F4055-7B32-6644-2F11-13D905E76E47}"/>
+                  </a:ext>
+                </a:extLst>
+              </p:cNvPr>
+              <p:cNvSpPr/>
+              <p:nvPr/>
+            </p:nvSpPr>
+            <p:spPr>
+              <a:xfrm>
+                <a:off x="8136941" y="5917072"/>
+                <a:ext cx="534831" cy="622989"/>
+              </a:xfrm>
+              <a:prstGeom prst="roundRect">
+                <a:avLst>
+                  <a:gd name="adj" fmla="val 3189"/>
+                </a:avLst>
+              </a:prstGeom>
+              <a:solidFill>
+                <a:schemeClr val="accent1">
+                  <a:lumMod val="60000"/>
+                  <a:lumOff val="40000"/>
+                  <a:alpha val="47843"/>
+                </a:schemeClr>
+              </a:solidFill>
+              <a:ln w="3175">
+                <a:solidFill>
+                  <a:schemeClr val="accent1">
+                    <a:lumMod val="50000"/>
+                  </a:schemeClr>
+                </a:solidFill>
+              </a:ln>
+            </p:spPr>
+            <p:style>
+              <a:lnRef idx="2">
+                <a:schemeClr val="accent1">
+                  <a:shade val="15000"/>
+                </a:schemeClr>
+              </a:lnRef>
+              <a:fillRef idx="1">
+                <a:schemeClr val="accent1"/>
+              </a:fillRef>
+              <a:effectRef idx="0">
+                <a:schemeClr val="accent1"/>
+              </a:effectRef>
+              <a:fontRef idx="minor">
+                <a:schemeClr val="lt1"/>
+              </a:fontRef>
+            </p:style>
+            <p:txBody>
+              <a:bodyPr lIns="36000" tIns="36000" rIns="36000" bIns="36000" rtlCol="0" anchor="ctr"/>
+              <a:lstStyle/>
+              <a:p>
+                <a:pPr marL="0" marR="0" lvl="0" indent="0" algn="ctr" defTabSz="914400" rtl="0" eaLnBrk="1" fontAlgn="auto" latinLnBrk="0" hangingPunct="1">
+                  <a:lnSpc>
+                    <a:spcPct val="100000"/>
+                  </a:lnSpc>
+                  <a:spcBef>
+                    <a:spcPts val="0"/>
+                  </a:spcBef>
+                  <a:spcAft>
+                    <a:spcPts val="0"/>
+                  </a:spcAft>
+                  <a:buClrTx/>
+                  <a:buSzTx/>
+                  <a:buFontTx/>
+                  <a:buNone/>
+                  <a:tabLst/>
+                  <a:defRPr/>
+                </a:pPr>
+                <a:endParaRPr kumimoji="0" lang="en-GB" sz="2400" b="1" i="0" u="none" strike="noStrike" kern="1200" cap="none" spc="0" normalizeH="0" baseline="0" noProof="0" dirty="0">
+                  <a:ln>
+                    <a:noFill/>
+                  </a:ln>
+                  <a:solidFill>
+                    <a:schemeClr val="accent1"/>
+                  </a:solidFill>
+                  <a:effectLst/>
+                  <a:uLnTx/>
+                  <a:uFillTx/>
+                  <a:latin typeface="Century Gothic" panose="020B0502020202020204" pitchFamily="34" charset="0"/>
+                </a:endParaRPr>
+              </a:p>
+            </p:txBody>
+          </p:sp>
+          <p:sp>
+            <p:nvSpPr>
+              <p:cNvPr id="266" name="Rounded Rectangle 265">
+                <a:extLst>
+                  <a:ext uri="{FF2B5EF4-FFF2-40B4-BE49-F238E27FC236}">
+                    <a16:creationId xmlns:a16="http://schemas.microsoft.com/office/drawing/2014/main" id="{E7CEFA8B-FA1D-724F-7AD9-22A15FD9D94D}"/>
+                  </a:ext>
+                </a:extLst>
+              </p:cNvPr>
+              <p:cNvSpPr/>
+              <p:nvPr/>
+            </p:nvSpPr>
+            <p:spPr>
+              <a:xfrm>
+                <a:off x="8136942" y="5623858"/>
+                <a:ext cx="430650" cy="249606"/>
+              </a:xfrm>
+              <a:prstGeom prst="roundRect">
+                <a:avLst>
+                  <a:gd name="adj" fmla="val 3189"/>
+                </a:avLst>
+              </a:prstGeom>
+              <a:solidFill>
+                <a:schemeClr val="bg1">
+                  <a:lumMod val="75000"/>
+                  <a:alpha val="47843"/>
+                </a:schemeClr>
+              </a:solidFill>
+              <a:ln w="3175">
+                <a:solidFill>
+                  <a:schemeClr val="bg2">
+                    <a:lumMod val="50000"/>
+                  </a:schemeClr>
+                </a:solidFill>
+              </a:ln>
+            </p:spPr>
+            <p:style>
+              <a:lnRef idx="2">
+                <a:schemeClr val="accent1">
+                  <a:shade val="15000"/>
+                </a:schemeClr>
+              </a:lnRef>
+              <a:fillRef idx="1">
+                <a:schemeClr val="accent1"/>
+              </a:fillRef>
+              <a:effectRef idx="0">
+                <a:schemeClr val="accent1"/>
+              </a:effectRef>
+              <a:fontRef idx="minor">
+                <a:schemeClr val="lt1"/>
+              </a:fontRef>
+            </p:style>
+            <p:txBody>
+              <a:bodyPr lIns="36000" tIns="36000" rIns="36000" bIns="36000" rtlCol="0" anchor="ctr"/>
+              <a:lstStyle/>
+              <a:p>
+                <a:pPr marL="0" marR="0" lvl="0" indent="0" algn="ctr" defTabSz="914400" rtl="0" eaLnBrk="1" fontAlgn="auto" latinLnBrk="0" hangingPunct="1">
+                  <a:lnSpc>
+                    <a:spcPct val="100000"/>
+                  </a:lnSpc>
+                  <a:spcBef>
+                    <a:spcPts val="0"/>
+                  </a:spcBef>
+                  <a:spcAft>
+                    <a:spcPts val="0"/>
+                  </a:spcAft>
+                  <a:buClrTx/>
+                  <a:buSzTx/>
+                  <a:buFontTx/>
+                  <a:buNone/>
+                  <a:tabLst/>
+                  <a:defRPr/>
+                </a:pPr>
+                <a:endParaRPr kumimoji="0" lang="en-GB" sz="2400" b="1" i="0" u="none" strike="noStrike" kern="1200" cap="none" spc="0" normalizeH="0" baseline="0" noProof="0" dirty="0">
+                  <a:ln>
+                    <a:noFill/>
+                  </a:ln>
+                  <a:solidFill>
+                    <a:srgbClr val="FFFFFF">
+                      <a:lumMod val="50000"/>
+                    </a:srgbClr>
+                  </a:solidFill>
+                  <a:effectLst/>
+                  <a:uLnTx/>
+                  <a:uFillTx/>
+                  <a:latin typeface="Century Gothic" panose="020B0502020202020204" pitchFamily="34" charset="0"/>
+                </a:endParaRPr>
+              </a:p>
+            </p:txBody>
+          </p:sp>
+          <p:sp>
+            <p:nvSpPr>
+              <p:cNvPr id="306" name="Rounded Rectangle 305">
+                <a:extLst>
+                  <a:ext uri="{FF2B5EF4-FFF2-40B4-BE49-F238E27FC236}">
+                    <a16:creationId xmlns:a16="http://schemas.microsoft.com/office/drawing/2014/main" id="{6B437637-9106-993B-E5B3-5B2EB02C7F84}"/>
+                  </a:ext>
+                </a:extLst>
+              </p:cNvPr>
+              <p:cNvSpPr/>
+              <p:nvPr/>
+            </p:nvSpPr>
+            <p:spPr>
+              <a:xfrm>
+                <a:off x="8631796" y="5623858"/>
+                <a:ext cx="565104" cy="249606"/>
+              </a:xfrm>
+              <a:prstGeom prst="roundRect">
+                <a:avLst>
+                  <a:gd name="adj" fmla="val 5628"/>
+                </a:avLst>
+              </a:prstGeom>
+              <a:noFill/>
+              <a:ln w="3175">
+                <a:solidFill>
+                  <a:schemeClr val="accent5">
+                    <a:lumMod val="60000"/>
+                    <a:lumOff val="40000"/>
+                  </a:schemeClr>
+                </a:solidFill>
+              </a:ln>
+            </p:spPr>
+            <p:style>
+              <a:lnRef idx="2">
+                <a:schemeClr val="accent1">
+                  <a:shade val="15000"/>
+                </a:schemeClr>
+              </a:lnRef>
+              <a:fillRef idx="1">
+                <a:schemeClr val="accent1"/>
+              </a:fillRef>
+              <a:effectRef idx="0">
+                <a:schemeClr val="accent1"/>
+              </a:effectRef>
+              <a:fontRef idx="minor">
+                <a:schemeClr val="lt1"/>
+              </a:fontRef>
+            </p:style>
+            <p:txBody>
+              <a:bodyPr lIns="36000" tIns="36000" rIns="36000" bIns="36000" rtlCol="0" anchor="ctr"/>
+              <a:lstStyle/>
+              <a:p>
+                <a:pPr marL="0" marR="0" lvl="0" indent="0" algn="ctr" defTabSz="914400" rtl="0" eaLnBrk="1" fontAlgn="auto" latinLnBrk="0" hangingPunct="1">
+                  <a:lnSpc>
+                    <a:spcPct val="100000"/>
+                  </a:lnSpc>
+                  <a:spcBef>
+                    <a:spcPts val="0"/>
+                  </a:spcBef>
+                  <a:spcAft>
+                    <a:spcPts val="0"/>
+                  </a:spcAft>
+                  <a:buClrTx/>
+                  <a:buSzTx/>
+                  <a:buFontTx/>
+                  <a:buNone/>
+                  <a:tabLst/>
+                  <a:defRPr/>
+                </a:pPr>
+                <a:endParaRPr kumimoji="0" lang="en-GB" sz="2400" b="1" i="0" u="none" strike="noStrike" kern="1200" cap="none" spc="0" normalizeH="0" baseline="0" noProof="0" dirty="0">
+                  <a:ln>
+                    <a:noFill/>
+                  </a:ln>
+                  <a:solidFill>
+                    <a:srgbClr val="553278">
+                      <a:lumMod val="60000"/>
+                      <a:lumOff val="40000"/>
+                    </a:srgbClr>
+                  </a:solidFill>
+                  <a:effectLst/>
+                  <a:uLnTx/>
+                  <a:uFillTx/>
+                  <a:latin typeface="Century Gothic" panose="020B0502020202020204" pitchFamily="34" charset="0"/>
+                </a:endParaRPr>
+              </a:p>
+            </p:txBody>
+          </p:sp>
+        </p:grpSp>
+        <p:sp>
+          <p:nvSpPr>
+            <p:cNvPr id="318" name="TextBox 317">
+              <a:extLst>
+                <a:ext uri="{FF2B5EF4-FFF2-40B4-BE49-F238E27FC236}">
+                  <a16:creationId xmlns:a16="http://schemas.microsoft.com/office/drawing/2014/main" id="{99F0ED12-ABB2-213D-EB1A-1973A256BF9D}"/>
+                </a:ext>
+              </a:extLst>
+            </p:cNvPr>
+            <p:cNvSpPr txBox="1"/>
+            <p:nvPr/>
+          </p:nvSpPr>
+          <p:spPr>
+            <a:xfrm>
+              <a:off x="249977" y="19493999"/>
+              <a:ext cx="2875996" cy="1077218"/>
+            </a:xfrm>
+            <a:prstGeom prst="rect">
+              <a:avLst/>
+            </a:prstGeom>
+            <a:noFill/>
+          </p:spPr>
+          <p:txBody>
+            <a:bodyPr wrap="square" rtlCol="0">
+              <a:spAutoFit/>
+            </a:bodyPr>
+            <a:lstStyle/>
+            <a:p>
+              <a:pPr algn="ctr"/>
+              <a:r>
+                <a:rPr lang="en-GB" sz="1600" i="1" dirty="0">
+                  <a:solidFill>
+                    <a:schemeClr val="bg1">
+                      <a:lumMod val="50000"/>
+                    </a:schemeClr>
+                  </a:solidFill>
+                  <a:latin typeface="Century Gothic" panose="020B0502020202020204" pitchFamily="34" charset="0"/>
+                </a:rPr>
+                <a:t>Indication of the areas of the model that would be used to satisfy a given use case. Informative</a:t>
+              </a:r>
+              <a:endParaRPr lang="en-GB" sz="1600" i="1" dirty="0"/>
+            </a:p>
+          </p:txBody>
+        </p:sp>
+      </p:grpSp>
     </p:spTree>
     <p:extLst>
       <p:ext uri="{BB962C8B-B14F-4D97-AF65-F5344CB8AC3E}">
@@ -26711,12 +27445,14 @@
 </file>
 
 <file path=customXml/item1.xml><?xml version="1.0" encoding="utf-8"?>
-<?mso-contentType ?>
-<FormTemplates xmlns="http://schemas.microsoft.com/sharepoint/v3/contenttype/forms">
-  <Display>DocumentLibraryForm</Display>
-  <Edit>DocumentLibraryForm</Edit>
-  <New>DocumentLibraryForm</New>
-</FormTemplates>
+<p:properties xmlns:p="http://schemas.microsoft.com/office/2006/metadata/properties" xmlns:xsi="http://www.w3.org/2001/XMLSchema-instance" xmlns:pc="http://schemas.microsoft.com/office/infopath/2007/PartnerControls">
+  <documentManagement>
+    <lcf76f155ced4ddcb4097134ff3c332f xmlns="98eacbea-7562-4a40-a7f2-e999cdc0cec5">
+      <Terms xmlns="http://schemas.microsoft.com/office/infopath/2007/PartnerControls"/>
+    </lcf76f155ced4ddcb4097134ff3c332f>
+    <TaxCatchAll xmlns="75bf9804-c18d-470a-a27f-eeaf4abcd247" xsi:nil="true"/>
+  </documentManagement>
+</p:properties>
 </file>
 
 <file path=customXml/item2.xml><?xml version="1.0" encoding="utf-8"?>
@@ -26927,20 +27663,27 @@
 </file>
 
 <file path=customXml/item3.xml><?xml version="1.0" encoding="utf-8"?>
-<p:properties xmlns:p="http://schemas.microsoft.com/office/2006/metadata/properties" xmlns:xsi="http://www.w3.org/2001/XMLSchema-instance" xmlns:pc="http://schemas.microsoft.com/office/infopath/2007/PartnerControls">
-  <documentManagement>
-    <lcf76f155ced4ddcb4097134ff3c332f xmlns="98eacbea-7562-4a40-a7f2-e999cdc0cec5">
-      <Terms xmlns="http://schemas.microsoft.com/office/infopath/2007/PartnerControls"/>
-    </lcf76f155ced4ddcb4097134ff3c332f>
-    <TaxCatchAll xmlns="75bf9804-c18d-470a-a27f-eeaf4abcd247" xsi:nil="true"/>
-  </documentManagement>
-</p:properties>
+<?mso-contentType ?>
+<FormTemplates xmlns="http://schemas.microsoft.com/sharepoint/v3/contenttype/forms">
+  <Display>DocumentLibraryForm</Display>
+  <Edit>DocumentLibraryForm</Edit>
+  <New>DocumentLibraryForm</New>
+</FormTemplates>
 </file>
 
 <file path=customXml/itemProps1.xml><?xml version="1.0" encoding="utf-8"?>
-<ds:datastoreItem xmlns:ds="http://schemas.openxmlformats.org/officeDocument/2006/customXml" ds:itemID="{7D880353-A811-4A5E-ACC7-78B678F8698F}">
+<ds:datastoreItem xmlns:ds="http://schemas.openxmlformats.org/officeDocument/2006/customXml" ds:itemID="{0608C028-DB74-4132-93E9-98A6B8817B9A}">
   <ds:schemaRefs>
-    <ds:schemaRef ds:uri="http://schemas.microsoft.com/sharepoint/v3/contenttype/forms"/>
+    <ds:schemaRef ds:uri="http://purl.org/dc/terms/"/>
+    <ds:schemaRef ds:uri="http://schemas.openxmlformats.org/package/2006/metadata/core-properties"/>
+    <ds:schemaRef ds:uri="http://schemas.microsoft.com/office/2006/documentManagement/types"/>
+    <ds:schemaRef ds:uri="http://purl.org/dc/elements/1.1/"/>
+    <ds:schemaRef ds:uri="http://www.w3.org/XML/1998/namespace"/>
+    <ds:schemaRef ds:uri="http://purl.org/dc/dcmitype/"/>
+    <ds:schemaRef ds:uri="http://schemas.microsoft.com/office/infopath/2007/PartnerControls"/>
+    <ds:schemaRef ds:uri="75bf9804-c18d-470a-a27f-eeaf4abcd247"/>
+    <ds:schemaRef ds:uri="98eacbea-7562-4a40-a7f2-e999cdc0cec5"/>
+    <ds:schemaRef ds:uri="http://schemas.microsoft.com/office/2006/metadata/properties"/>
   </ds:schemaRefs>
 </ds:datastoreItem>
 </file>
@@ -26965,18 +27708,9 @@
 </file>
 
 <file path=customXml/itemProps3.xml><?xml version="1.0" encoding="utf-8"?>
-<ds:datastoreItem xmlns:ds="http://schemas.openxmlformats.org/officeDocument/2006/customXml" ds:itemID="{0608C028-DB74-4132-93E9-98A6B8817B9A}">
+<ds:datastoreItem xmlns:ds="http://schemas.openxmlformats.org/officeDocument/2006/customXml" ds:itemID="{7D880353-A811-4A5E-ACC7-78B678F8698F}">
   <ds:schemaRefs>
-    <ds:schemaRef ds:uri="http://purl.org/dc/terms/"/>
-    <ds:schemaRef ds:uri="http://schemas.openxmlformats.org/package/2006/metadata/core-properties"/>
-    <ds:schemaRef ds:uri="http://schemas.microsoft.com/office/2006/documentManagement/types"/>
-    <ds:schemaRef ds:uri="http://purl.org/dc/elements/1.1/"/>
-    <ds:schemaRef ds:uri="http://www.w3.org/XML/1998/namespace"/>
-    <ds:schemaRef ds:uri="http://purl.org/dc/dcmitype/"/>
-    <ds:schemaRef ds:uri="http://schemas.microsoft.com/office/infopath/2007/PartnerControls"/>
-    <ds:schemaRef ds:uri="75bf9804-c18d-470a-a27f-eeaf4abcd247"/>
-    <ds:schemaRef ds:uri="98eacbea-7562-4a40-a7f2-e999cdc0cec5"/>
-    <ds:schemaRef ds:uri="http://schemas.microsoft.com/office/2006/metadata/properties"/>
+    <ds:schemaRef ds:uri="http://schemas.microsoft.com/sharepoint/v3/contenttype/forms"/>
   </ds:schemaRefs>
 </ds:datastoreItem>
 </file>
</xml_diff>